<commit_message>
slightly modified image used in conclusion
</commit_message>
<xml_diff>
--- a/viz/Machine_Learning_Algorithms_Used.pptx
+++ b/viz/Machine_Learning_Algorithms_Used.pptx
@@ -288,7 +288,7 @@
           <a:p>
             <a:fld id="{C963622B-900B-4613-9823-3D796161F9B3}" type="datetimeFigureOut">
               <a:rPr lang="en-US" smtClean="0"/>
-              <a:t>12/9/2015</a:t>
+              <a:t>12/10/2015</a:t>
             </a:fld>
             <a:endParaRPr lang="en-US"/>
           </a:p>
@@ -458,7 +458,7 @@
           <a:p>
             <a:fld id="{C963622B-900B-4613-9823-3D796161F9B3}" type="datetimeFigureOut">
               <a:rPr lang="en-US" smtClean="0"/>
-              <a:t>12/9/2015</a:t>
+              <a:t>12/10/2015</a:t>
             </a:fld>
             <a:endParaRPr lang="en-US"/>
           </a:p>
@@ -638,7 +638,7 @@
           <a:p>
             <a:fld id="{C963622B-900B-4613-9823-3D796161F9B3}" type="datetimeFigureOut">
               <a:rPr lang="en-US" smtClean="0"/>
-              <a:t>12/9/2015</a:t>
+              <a:t>12/10/2015</a:t>
             </a:fld>
             <a:endParaRPr lang="en-US"/>
           </a:p>
@@ -808,7 +808,7 @@
           <a:p>
             <a:fld id="{C963622B-900B-4613-9823-3D796161F9B3}" type="datetimeFigureOut">
               <a:rPr lang="en-US" smtClean="0"/>
-              <a:t>12/9/2015</a:t>
+              <a:t>12/10/2015</a:t>
             </a:fld>
             <a:endParaRPr lang="en-US"/>
           </a:p>
@@ -1054,7 +1054,7 @@
           <a:p>
             <a:fld id="{C963622B-900B-4613-9823-3D796161F9B3}" type="datetimeFigureOut">
               <a:rPr lang="en-US" smtClean="0"/>
-              <a:t>12/9/2015</a:t>
+              <a:t>12/10/2015</a:t>
             </a:fld>
             <a:endParaRPr lang="en-US"/>
           </a:p>
@@ -1342,7 +1342,7 @@
           <a:p>
             <a:fld id="{C963622B-900B-4613-9823-3D796161F9B3}" type="datetimeFigureOut">
               <a:rPr lang="en-US" smtClean="0"/>
-              <a:t>12/9/2015</a:t>
+              <a:t>12/10/2015</a:t>
             </a:fld>
             <a:endParaRPr lang="en-US"/>
           </a:p>
@@ -1764,7 +1764,7 @@
           <a:p>
             <a:fld id="{C963622B-900B-4613-9823-3D796161F9B3}" type="datetimeFigureOut">
               <a:rPr lang="en-US" smtClean="0"/>
-              <a:t>12/9/2015</a:t>
+              <a:t>12/10/2015</a:t>
             </a:fld>
             <a:endParaRPr lang="en-US"/>
           </a:p>
@@ -1882,7 +1882,7 @@
           <a:p>
             <a:fld id="{C963622B-900B-4613-9823-3D796161F9B3}" type="datetimeFigureOut">
               <a:rPr lang="en-US" smtClean="0"/>
-              <a:t>12/9/2015</a:t>
+              <a:t>12/10/2015</a:t>
             </a:fld>
             <a:endParaRPr lang="en-US"/>
           </a:p>
@@ -1977,7 +1977,7 @@
           <a:p>
             <a:fld id="{C963622B-900B-4613-9823-3D796161F9B3}" type="datetimeFigureOut">
               <a:rPr lang="en-US" smtClean="0"/>
-              <a:t>12/9/2015</a:t>
+              <a:t>12/10/2015</a:t>
             </a:fld>
             <a:endParaRPr lang="en-US"/>
           </a:p>
@@ -2254,7 +2254,7 @@
           <a:p>
             <a:fld id="{C963622B-900B-4613-9823-3D796161F9B3}" type="datetimeFigureOut">
               <a:rPr lang="en-US" smtClean="0"/>
-              <a:t>12/9/2015</a:t>
+              <a:t>12/10/2015</a:t>
             </a:fld>
             <a:endParaRPr lang="en-US"/>
           </a:p>
@@ -2507,7 +2507,7 @@
           <a:p>
             <a:fld id="{C963622B-900B-4613-9823-3D796161F9B3}" type="datetimeFigureOut">
               <a:rPr lang="en-US" smtClean="0"/>
-              <a:t>12/9/2015</a:t>
+              <a:t>12/10/2015</a:t>
             </a:fld>
             <a:endParaRPr lang="en-US"/>
           </a:p>
@@ -2720,7 +2720,7 @@
           <a:p>
             <a:fld id="{C963622B-900B-4613-9823-3D796161F9B3}" type="datetimeFigureOut">
               <a:rPr lang="en-US" smtClean="0"/>
-              <a:t>12/9/2015</a:t>
+              <a:t>12/10/2015</a:t>
             </a:fld>
             <a:endParaRPr lang="en-US"/>
           </a:p>
@@ -3501,7 +3501,7 @@
         <p:spPr>
           <a:xfrm>
             <a:off x="4572000" y="3579674"/>
-            <a:ext cx="3124200" cy="1754326"/>
+            <a:ext cx="3124200" cy="1200329"/>
           </a:xfrm>
           <a:prstGeom prst="rect">
             <a:avLst/>
@@ -3578,39 +3578,7 @@
                   </a:schemeClr>
                 </a:solidFill>
               </a:rPr>
-              <a:t>KNN</a:t>
-            </a:r>
-          </a:p>
-          <a:p>
-            <a:pPr marL="742950" lvl="1" indent="-285750">
-              <a:buFont typeface="Courier New" panose="02070309020205020404" pitchFamily="49" charset="0"/>
-              <a:buChar char="o"/>
-            </a:pPr>
-            <a:r>
-              <a:rPr lang="en-US" dirty="0" smtClean="0">
-                <a:solidFill>
-                  <a:schemeClr val="bg1">
-                    <a:lumMod val="50000"/>
-                  </a:schemeClr>
-                </a:solidFill>
-              </a:rPr>
-              <a:t>Trees</a:t>
-            </a:r>
-          </a:p>
-          <a:p>
-            <a:pPr marL="742950" lvl="1" indent="-285750">
-              <a:buFont typeface="Courier New" panose="02070309020205020404" pitchFamily="49" charset="0"/>
-              <a:buChar char="o"/>
-            </a:pPr>
-            <a:r>
-              <a:rPr lang="en-US" dirty="0" smtClean="0">
-                <a:solidFill>
-                  <a:schemeClr val="bg1">
-                    <a:lumMod val="50000"/>
-                  </a:schemeClr>
-                </a:solidFill>
-              </a:rPr>
-              <a:t>SVM</a:t>
+              <a:t>KNN, Trees, SVM</a:t>
             </a:r>
             <a:endParaRPr lang="en-US" dirty="0">
               <a:solidFill>
@@ -3630,7 +3598,7 @@
         </p:nvCxnSpPr>
         <p:spPr>
           <a:xfrm flipV="1">
-            <a:off x="4572000" y="1600200"/>
+            <a:off x="4572000" y="1447800"/>
             <a:ext cx="0" cy="3657600"/>
           </a:xfrm>
           <a:prstGeom prst="line">
@@ -3759,6 +3727,69 @@
             <a:endParaRPr lang="en-US" sz="2000" b="1" u="sng" dirty="0">
               <a:solidFill>
                 <a:schemeClr val="tx2"/>
+              </a:solidFill>
+            </a:endParaRPr>
+          </a:p>
+        </p:txBody>
+      </p:sp>
+      <p:sp>
+        <p:nvSpPr>
+          <p:cNvPr id="2" name="TextBox 1"/>
+          <p:cNvSpPr txBox="1"/>
+          <p:nvPr/>
+        </p:nvSpPr>
+        <p:spPr>
+          <a:xfrm>
+            <a:off x="1752600" y="5181600"/>
+            <a:ext cx="5656228" cy="307777"/>
+          </a:xfrm>
+          <a:prstGeom prst="rect">
+            <a:avLst/>
+          </a:prstGeom>
+          <a:noFill/>
+        </p:spPr>
+        <p:txBody>
+          <a:bodyPr wrap="none" rtlCol="0">
+            <a:spAutoFit/>
+          </a:bodyPr>
+          <a:lstStyle/>
+          <a:p>
+            <a:r>
+              <a:rPr lang="en-US" sz="1400" i="1" dirty="0" smtClean="0">
+                <a:solidFill>
+                  <a:schemeClr val="bg1">
+                    <a:lumMod val="50000"/>
+                  </a:schemeClr>
+                </a:solidFill>
+              </a:rPr>
+              <a:t>Techniques used in the project are in </a:t>
+            </a:r>
+            <a:r>
+              <a:rPr lang="en-US" sz="1400" b="1" i="1" dirty="0" smtClean="0">
+                <a:solidFill>
+                  <a:schemeClr val="tx1">
+                    <a:lumMod val="65000"/>
+                    <a:lumOff val="35000"/>
+                  </a:schemeClr>
+                </a:solidFill>
+              </a:rPr>
+              <a:t>bold</a:t>
+            </a:r>
+            <a:r>
+              <a:rPr lang="en-US" sz="1400" i="1" dirty="0" smtClean="0">
+                <a:solidFill>
+                  <a:schemeClr val="bg1">
+                    <a:lumMod val="50000"/>
+                  </a:schemeClr>
+                </a:solidFill>
+              </a:rPr>
+              <a:t>, exemplar alternatives also listed.</a:t>
+            </a:r>
+            <a:endParaRPr lang="en-US" sz="1400" i="1" dirty="0">
+              <a:solidFill>
+                <a:schemeClr val="bg1">
+                  <a:lumMod val="50000"/>
+                </a:schemeClr>
               </a:solidFill>
             </a:endParaRPr>
           </a:p>

</xml_diff>